<commit_message>
KBLFRM-1072: Added ReferenceSurfaceDefintion to ConnectorHousingSpecification
</commit_message>
<xml_diff>
--- a/vec/models/images/drawings.pptx
+++ b/vec/models/images/drawings.pptx
@@ -261,7 +261,7 @@
           <a:p>
             <a:fld id="{70243E1B-DEEE-4714-BBC7-16067AB9A801}" type="datetimeFigureOut">
               <a:rPr lang="de-DE" smtClean="0"/>
-              <a:t>16.11.2023</a:t>
+              <a:t>20.12.2024</a:t>
             </a:fld>
             <a:endParaRPr lang="de-DE"/>
           </a:p>
@@ -459,7 +459,7 @@
           <a:p>
             <a:fld id="{70243E1B-DEEE-4714-BBC7-16067AB9A801}" type="datetimeFigureOut">
               <a:rPr lang="de-DE" smtClean="0"/>
-              <a:t>16.11.2023</a:t>
+              <a:t>20.12.2024</a:t>
             </a:fld>
             <a:endParaRPr lang="de-DE"/>
           </a:p>
@@ -667,7 +667,7 @@
           <a:p>
             <a:fld id="{70243E1B-DEEE-4714-BBC7-16067AB9A801}" type="datetimeFigureOut">
               <a:rPr lang="de-DE" smtClean="0"/>
-              <a:t>16.11.2023</a:t>
+              <a:t>20.12.2024</a:t>
             </a:fld>
             <a:endParaRPr lang="de-DE"/>
           </a:p>
@@ -865,7 +865,7 @@
           <a:p>
             <a:fld id="{70243E1B-DEEE-4714-BBC7-16067AB9A801}" type="datetimeFigureOut">
               <a:rPr lang="de-DE" smtClean="0"/>
-              <a:t>16.11.2023</a:t>
+              <a:t>20.12.2024</a:t>
             </a:fld>
             <a:endParaRPr lang="de-DE"/>
           </a:p>
@@ -1140,7 +1140,7 @@
           <a:p>
             <a:fld id="{70243E1B-DEEE-4714-BBC7-16067AB9A801}" type="datetimeFigureOut">
               <a:rPr lang="de-DE" smtClean="0"/>
-              <a:t>16.11.2023</a:t>
+              <a:t>20.12.2024</a:t>
             </a:fld>
             <a:endParaRPr lang="de-DE"/>
           </a:p>
@@ -1405,7 +1405,7 @@
           <a:p>
             <a:fld id="{70243E1B-DEEE-4714-BBC7-16067AB9A801}" type="datetimeFigureOut">
               <a:rPr lang="de-DE" smtClean="0"/>
-              <a:t>16.11.2023</a:t>
+              <a:t>20.12.2024</a:t>
             </a:fld>
             <a:endParaRPr lang="de-DE"/>
           </a:p>
@@ -1817,7 +1817,7 @@
           <a:p>
             <a:fld id="{70243E1B-DEEE-4714-BBC7-16067AB9A801}" type="datetimeFigureOut">
               <a:rPr lang="de-DE" smtClean="0"/>
-              <a:t>16.11.2023</a:t>
+              <a:t>20.12.2024</a:t>
             </a:fld>
             <a:endParaRPr lang="de-DE"/>
           </a:p>
@@ -1958,7 +1958,7 @@
           <a:p>
             <a:fld id="{70243E1B-DEEE-4714-BBC7-16067AB9A801}" type="datetimeFigureOut">
               <a:rPr lang="de-DE" smtClean="0"/>
-              <a:t>16.11.2023</a:t>
+              <a:t>20.12.2024</a:t>
             </a:fld>
             <a:endParaRPr lang="de-DE"/>
           </a:p>
@@ -2071,7 +2071,7 @@
           <a:p>
             <a:fld id="{70243E1B-DEEE-4714-BBC7-16067AB9A801}" type="datetimeFigureOut">
               <a:rPr lang="de-DE" smtClean="0"/>
-              <a:t>16.11.2023</a:t>
+              <a:t>20.12.2024</a:t>
             </a:fld>
             <a:endParaRPr lang="de-DE"/>
           </a:p>
@@ -2382,7 +2382,7 @@
           <a:p>
             <a:fld id="{70243E1B-DEEE-4714-BBC7-16067AB9A801}" type="datetimeFigureOut">
               <a:rPr lang="de-DE" smtClean="0"/>
-              <a:t>16.11.2023</a:t>
+              <a:t>20.12.2024</a:t>
             </a:fld>
             <a:endParaRPr lang="de-DE"/>
           </a:p>
@@ -2670,7 +2670,7 @@
           <a:p>
             <a:fld id="{70243E1B-DEEE-4714-BBC7-16067AB9A801}" type="datetimeFigureOut">
               <a:rPr lang="de-DE" smtClean="0"/>
-              <a:t>16.11.2023</a:t>
+              <a:t>20.12.2024</a:t>
             </a:fld>
             <a:endParaRPr lang="de-DE"/>
           </a:p>
@@ -2911,7 +2911,7 @@
           <a:p>
             <a:fld id="{70243E1B-DEEE-4714-BBC7-16067AB9A801}" type="datetimeFigureOut">
               <a:rPr lang="de-DE" smtClean="0"/>
-              <a:t>16.11.2023</a:t>
+              <a:t>20.12.2024</a:t>
             </a:fld>
             <a:endParaRPr lang="de-DE"/>
           </a:p>
@@ -4949,7 +4949,7 @@
           <a:lstStyle/>
           <a:p>
             <a:pPr algn="ctr"/>
-            <a:endParaRPr lang="de-DE"/>
+            <a:endParaRPr lang="de-DE" dirty="0"/>
           </a:p>
         </p:txBody>
       </p:sp>
@@ -5158,7 +5158,7 @@
         </p:nvCxnSpPr>
         <p:spPr>
           <a:xfrm flipH="1">
-            <a:off x="962123" y="3244312"/>
+            <a:off x="586645" y="3659542"/>
             <a:ext cx="1008531" cy="614082"/>
           </a:xfrm>
           <a:prstGeom prst="straightConnector1">
@@ -5197,7 +5197,7 @@
         </p:nvSpPr>
         <p:spPr>
           <a:xfrm rot="19693160">
-            <a:off x="1017664" y="3377105"/>
+            <a:off x="642186" y="3779084"/>
             <a:ext cx="1373930" cy="253916"/>
           </a:xfrm>
           <a:prstGeom prst="rect">
@@ -6699,6 +6699,686 @@
             <a:r>
               <a:rPr lang="de-DE" sz="1050" dirty="0"/>
               <a:t>)</a:t>
+            </a:r>
+          </a:p>
+        </p:txBody>
+      </p:sp>
+      <p:sp>
+        <p:nvSpPr>
+          <p:cNvPr id="3" name="Parallelogramm 2">
+            <a:extLst>
+              <a:ext uri="{FF2B5EF4-FFF2-40B4-BE49-F238E27FC236}">
+                <a16:creationId xmlns:a16="http://schemas.microsoft.com/office/drawing/2014/main" id="{BD19C194-698A-29FD-6BB9-333CAFC105B0}"/>
+              </a:ext>
+            </a:extLst>
+          </p:cNvPr>
+          <p:cNvSpPr/>
+          <p:nvPr/>
+        </p:nvSpPr>
+        <p:spPr>
+          <a:xfrm rot="16200000" flipH="1">
+            <a:off x="2932803" y="2414812"/>
+            <a:ext cx="458073" cy="263213"/>
+          </a:xfrm>
+          <a:prstGeom prst="parallelogram">
+            <a:avLst>
+              <a:gd name="adj" fmla="val 56582"/>
+            </a:avLst>
+          </a:prstGeom>
+          <a:pattFill prst="wdDnDiag">
+            <a:fgClr>
+              <a:schemeClr val="accent2">
+                <a:lumMod val="75000"/>
+              </a:schemeClr>
+            </a:fgClr>
+            <a:bgClr>
+              <a:schemeClr val="bg1"/>
+            </a:bgClr>
+          </a:pattFill>
+          <a:ln w="3175">
+            <a:solidFill>
+              <a:schemeClr val="tx1"/>
+            </a:solidFill>
+          </a:ln>
+        </p:spPr>
+        <p:style>
+          <a:lnRef idx="2">
+            <a:schemeClr val="accent1">
+              <a:shade val="15000"/>
+            </a:schemeClr>
+          </a:lnRef>
+          <a:fillRef idx="1">
+            <a:schemeClr val="accent1"/>
+          </a:fillRef>
+          <a:effectRef idx="0">
+            <a:schemeClr val="accent1"/>
+          </a:effectRef>
+          <a:fontRef idx="minor">
+            <a:schemeClr val="lt1"/>
+          </a:fontRef>
+        </p:style>
+        <p:txBody>
+          <a:bodyPr rtlCol="0" anchor="ctr"/>
+          <a:lstStyle/>
+          <a:p>
+            <a:pPr algn="ctr"/>
+            <a:endParaRPr lang="de-DE" dirty="0"/>
+          </a:p>
+        </p:txBody>
+      </p:sp>
+      <p:sp>
+        <p:nvSpPr>
+          <p:cNvPr id="39" name="Parallelogramm 38">
+            <a:extLst>
+              <a:ext uri="{FF2B5EF4-FFF2-40B4-BE49-F238E27FC236}">
+                <a16:creationId xmlns:a16="http://schemas.microsoft.com/office/drawing/2014/main" id="{BD8E70C2-F257-72FD-BFB2-9D901FB78D51}"/>
+              </a:ext>
+            </a:extLst>
+          </p:cNvPr>
+          <p:cNvSpPr/>
+          <p:nvPr/>
+        </p:nvSpPr>
+        <p:spPr>
+          <a:xfrm rot="19800000" flipH="1">
+            <a:off x="1270289" y="2505725"/>
+            <a:ext cx="458073" cy="263213"/>
+          </a:xfrm>
+          <a:prstGeom prst="parallelogram">
+            <a:avLst>
+              <a:gd name="adj" fmla="val 57855"/>
+            </a:avLst>
+          </a:prstGeom>
+          <a:pattFill prst="wdUpDiag">
+            <a:fgClr>
+              <a:schemeClr val="accent2">
+                <a:lumMod val="75000"/>
+              </a:schemeClr>
+            </a:fgClr>
+            <a:bgClr>
+              <a:schemeClr val="bg1"/>
+            </a:bgClr>
+          </a:pattFill>
+          <a:ln w="3175">
+            <a:solidFill>
+              <a:schemeClr val="tx1"/>
+            </a:solidFill>
+          </a:ln>
+        </p:spPr>
+        <p:style>
+          <a:lnRef idx="2">
+            <a:schemeClr val="accent1">
+              <a:shade val="15000"/>
+            </a:schemeClr>
+          </a:lnRef>
+          <a:fillRef idx="1">
+            <a:schemeClr val="accent1"/>
+          </a:fillRef>
+          <a:effectRef idx="0">
+            <a:schemeClr val="accent1"/>
+          </a:effectRef>
+          <a:fontRef idx="minor">
+            <a:schemeClr val="lt1"/>
+          </a:fontRef>
+        </p:style>
+        <p:txBody>
+          <a:bodyPr rtlCol="0" anchor="ctr"/>
+          <a:lstStyle/>
+          <a:p>
+            <a:pPr algn="ctr"/>
+            <a:endParaRPr lang="de-DE" dirty="0"/>
+          </a:p>
+        </p:txBody>
+      </p:sp>
+      <p:sp>
+        <p:nvSpPr>
+          <p:cNvPr id="40" name="Parallelogramm 39">
+            <a:extLst>
+              <a:ext uri="{FF2B5EF4-FFF2-40B4-BE49-F238E27FC236}">
+                <a16:creationId xmlns:a16="http://schemas.microsoft.com/office/drawing/2014/main" id="{45E65E89-85DE-819D-CE33-DEE9011CDB17}"/>
+              </a:ext>
+            </a:extLst>
+          </p:cNvPr>
+          <p:cNvSpPr/>
+          <p:nvPr/>
+        </p:nvSpPr>
+        <p:spPr>
+          <a:xfrm rot="16200000" flipH="1">
+            <a:off x="4267152" y="3278302"/>
+            <a:ext cx="302986" cy="149141"/>
+          </a:xfrm>
+          <a:prstGeom prst="parallelogram">
+            <a:avLst>
+              <a:gd name="adj" fmla="val 56582"/>
+            </a:avLst>
+          </a:prstGeom>
+          <a:pattFill prst="wdDnDiag">
+            <a:fgClr>
+              <a:schemeClr val="accent2">
+                <a:lumMod val="75000"/>
+              </a:schemeClr>
+            </a:fgClr>
+            <a:bgClr>
+              <a:schemeClr val="bg1"/>
+            </a:bgClr>
+          </a:pattFill>
+          <a:ln w="3175">
+            <a:solidFill>
+              <a:schemeClr val="tx1"/>
+            </a:solidFill>
+          </a:ln>
+        </p:spPr>
+        <p:style>
+          <a:lnRef idx="2">
+            <a:schemeClr val="accent1">
+              <a:shade val="15000"/>
+            </a:schemeClr>
+          </a:lnRef>
+          <a:fillRef idx="1">
+            <a:schemeClr val="accent1"/>
+          </a:fillRef>
+          <a:effectRef idx="0">
+            <a:schemeClr val="accent1"/>
+          </a:effectRef>
+          <a:fontRef idx="minor">
+            <a:schemeClr val="lt1"/>
+          </a:fontRef>
+        </p:style>
+        <p:txBody>
+          <a:bodyPr rtlCol="0" anchor="ctr"/>
+          <a:lstStyle/>
+          <a:p>
+            <a:pPr algn="ctr"/>
+            <a:endParaRPr lang="de-DE" dirty="0"/>
+          </a:p>
+        </p:txBody>
+      </p:sp>
+      <p:sp>
+        <p:nvSpPr>
+          <p:cNvPr id="41" name="Textfeld 40">
+            <a:extLst>
+              <a:ext uri="{FF2B5EF4-FFF2-40B4-BE49-F238E27FC236}">
+                <a16:creationId xmlns:a16="http://schemas.microsoft.com/office/drawing/2014/main" id="{BAD3B03F-B483-AFEF-4C0F-E66FE1A552D5}"/>
+              </a:ext>
+            </a:extLst>
+          </p:cNvPr>
+          <p:cNvSpPr txBox="1"/>
+          <p:nvPr/>
+        </p:nvSpPr>
+        <p:spPr>
+          <a:xfrm>
+            <a:off x="4490758" y="3173729"/>
+            <a:ext cx="1670650" cy="253916"/>
+          </a:xfrm>
+          <a:prstGeom prst="rect">
+            <a:avLst/>
+          </a:prstGeom>
+          <a:noFill/>
+        </p:spPr>
+        <p:txBody>
+          <a:bodyPr wrap="none" rtlCol="0">
+            <a:spAutoFit/>
+          </a:bodyPr>
+          <a:lstStyle/>
+          <a:p>
+            <a:r>
+              <a:rPr lang="de-DE" sz="1050" dirty="0" err="1"/>
+              <a:t>contact</a:t>
+            </a:r>
+            <a:r>
+              <a:rPr lang="de-DE" sz="1050" dirty="0"/>
+              <a:t> / </a:t>
+            </a:r>
+            <a:r>
+              <a:rPr lang="de-DE" sz="1050" dirty="0" err="1"/>
+              <a:t>reference</a:t>
+            </a:r>
+            <a:r>
+              <a:rPr lang="de-DE" sz="1050" dirty="0"/>
+              <a:t> </a:t>
+            </a:r>
+            <a:r>
+              <a:rPr lang="de-DE" sz="1050" dirty="0" err="1"/>
+              <a:t>surface</a:t>
+            </a:r>
+            <a:endParaRPr lang="de-DE" sz="1050" dirty="0"/>
+          </a:p>
+        </p:txBody>
+      </p:sp>
+      <p:cxnSp>
+        <p:nvCxnSpPr>
+          <p:cNvPr id="43" name="Gerader Verbinder 42">
+            <a:extLst>
+              <a:ext uri="{FF2B5EF4-FFF2-40B4-BE49-F238E27FC236}">
+                <a16:creationId xmlns:a16="http://schemas.microsoft.com/office/drawing/2014/main" id="{85ECEFD2-10BE-F989-6A77-1DAB337B1943}"/>
+              </a:ext>
+            </a:extLst>
+          </p:cNvPr>
+          <p:cNvCxnSpPr>
+            <a:cxnSpLocks/>
+          </p:cNvCxnSpPr>
+          <p:nvPr/>
+        </p:nvCxnSpPr>
+        <p:spPr>
+          <a:xfrm flipH="1" flipV="1">
+            <a:off x="917157" y="1494368"/>
+            <a:ext cx="526169" cy="350533"/>
+          </a:xfrm>
+          <a:prstGeom prst="line">
+            <a:avLst/>
+          </a:prstGeom>
+          <a:ln w="19050">
+            <a:solidFill>
+              <a:schemeClr val="accent2">
+                <a:lumMod val="75000"/>
+              </a:schemeClr>
+            </a:solidFill>
+            <a:prstDash val="dash"/>
+          </a:ln>
+        </p:spPr>
+        <p:style>
+          <a:lnRef idx="1">
+            <a:schemeClr val="accent1"/>
+          </a:lnRef>
+          <a:fillRef idx="0">
+            <a:schemeClr val="accent1"/>
+          </a:fillRef>
+          <a:effectRef idx="0">
+            <a:schemeClr val="accent1"/>
+          </a:effectRef>
+          <a:fontRef idx="minor">
+            <a:schemeClr val="tx1"/>
+          </a:fontRef>
+        </p:style>
+      </p:cxnSp>
+      <p:cxnSp>
+        <p:nvCxnSpPr>
+          <p:cNvPr id="45" name="Gerader Verbinder 44">
+            <a:extLst>
+              <a:ext uri="{FF2B5EF4-FFF2-40B4-BE49-F238E27FC236}">
+                <a16:creationId xmlns:a16="http://schemas.microsoft.com/office/drawing/2014/main" id="{26EE1E00-E9B6-EBC3-D575-A00B2602A5BC}"/>
+              </a:ext>
+            </a:extLst>
+          </p:cNvPr>
+          <p:cNvCxnSpPr>
+            <a:cxnSpLocks/>
+          </p:cNvCxnSpPr>
+          <p:nvPr/>
+        </p:nvCxnSpPr>
+        <p:spPr>
+          <a:xfrm flipH="1" flipV="1">
+            <a:off x="818176" y="2386604"/>
+            <a:ext cx="559329" cy="329991"/>
+          </a:xfrm>
+          <a:prstGeom prst="line">
+            <a:avLst/>
+          </a:prstGeom>
+          <a:ln w="19050">
+            <a:solidFill>
+              <a:schemeClr val="accent2">
+                <a:lumMod val="75000"/>
+              </a:schemeClr>
+            </a:solidFill>
+            <a:prstDash val="dash"/>
+          </a:ln>
+        </p:spPr>
+        <p:style>
+          <a:lnRef idx="1">
+            <a:schemeClr val="accent1"/>
+          </a:lnRef>
+          <a:fillRef idx="0">
+            <a:schemeClr val="accent1"/>
+          </a:fillRef>
+          <a:effectRef idx="0">
+            <a:schemeClr val="accent1"/>
+          </a:effectRef>
+          <a:fontRef idx="minor">
+            <a:schemeClr val="tx1"/>
+          </a:fontRef>
+        </p:style>
+      </p:cxnSp>
+      <p:cxnSp>
+        <p:nvCxnSpPr>
+          <p:cNvPr id="47" name="Gerader Verbinder 46">
+            <a:extLst>
+              <a:ext uri="{FF2B5EF4-FFF2-40B4-BE49-F238E27FC236}">
+                <a16:creationId xmlns:a16="http://schemas.microsoft.com/office/drawing/2014/main" id="{3C626917-4B6B-DAE9-DE30-4CA9EC0F3819}"/>
+              </a:ext>
+            </a:extLst>
+          </p:cNvPr>
+          <p:cNvCxnSpPr>
+            <a:cxnSpLocks/>
+          </p:cNvCxnSpPr>
+          <p:nvPr/>
+        </p:nvCxnSpPr>
+        <p:spPr>
+          <a:xfrm flipV="1">
+            <a:off x="1411648" y="1856016"/>
+            <a:ext cx="23518" cy="1231458"/>
+          </a:xfrm>
+          <a:prstGeom prst="line">
+            <a:avLst/>
+          </a:prstGeom>
+          <a:ln w="19050">
+            <a:solidFill>
+              <a:schemeClr val="accent2">
+                <a:lumMod val="75000"/>
+              </a:schemeClr>
+            </a:solidFill>
+            <a:prstDash val="dash"/>
+          </a:ln>
+        </p:spPr>
+        <p:style>
+          <a:lnRef idx="1">
+            <a:schemeClr val="accent1"/>
+          </a:lnRef>
+          <a:fillRef idx="0">
+            <a:schemeClr val="accent1"/>
+          </a:fillRef>
+          <a:effectRef idx="0">
+            <a:schemeClr val="accent1"/>
+          </a:effectRef>
+          <a:fontRef idx="minor">
+            <a:schemeClr val="tx1"/>
+          </a:fontRef>
+        </p:style>
+      </p:cxnSp>
+      <p:cxnSp>
+        <p:nvCxnSpPr>
+          <p:cNvPr id="50" name="Gerader Verbinder 49">
+            <a:extLst>
+              <a:ext uri="{FF2B5EF4-FFF2-40B4-BE49-F238E27FC236}">
+                <a16:creationId xmlns:a16="http://schemas.microsoft.com/office/drawing/2014/main" id="{69FDA27A-A24F-CF09-EF97-559307CAAA04}"/>
+              </a:ext>
+            </a:extLst>
+          </p:cNvPr>
+          <p:cNvCxnSpPr>
+            <a:cxnSpLocks/>
+          </p:cNvCxnSpPr>
+          <p:nvPr/>
+        </p:nvCxnSpPr>
+        <p:spPr>
+          <a:xfrm flipV="1">
+            <a:off x="3030233" y="2449440"/>
+            <a:ext cx="0" cy="1524350"/>
+          </a:xfrm>
+          <a:prstGeom prst="line">
+            <a:avLst/>
+          </a:prstGeom>
+          <a:ln w="19050">
+            <a:solidFill>
+              <a:schemeClr val="accent2">
+                <a:lumMod val="75000"/>
+              </a:schemeClr>
+            </a:solidFill>
+            <a:prstDash val="dash"/>
+          </a:ln>
+        </p:spPr>
+        <p:style>
+          <a:lnRef idx="1">
+            <a:schemeClr val="accent1"/>
+          </a:lnRef>
+          <a:fillRef idx="0">
+            <a:schemeClr val="accent1"/>
+          </a:fillRef>
+          <a:effectRef idx="0">
+            <a:schemeClr val="accent1"/>
+          </a:effectRef>
+          <a:fontRef idx="minor">
+            <a:schemeClr val="tx1"/>
+          </a:fontRef>
+        </p:style>
+      </p:cxnSp>
+      <p:cxnSp>
+        <p:nvCxnSpPr>
+          <p:cNvPr id="54" name="Gerade Verbindung mit Pfeil 53">
+            <a:extLst>
+              <a:ext uri="{FF2B5EF4-FFF2-40B4-BE49-F238E27FC236}">
+                <a16:creationId xmlns:a16="http://schemas.microsoft.com/office/drawing/2014/main" id="{3B30760D-F567-AAE9-4C34-627C2468AF93}"/>
+              </a:ext>
+            </a:extLst>
+          </p:cNvPr>
+          <p:cNvCxnSpPr>
+            <a:cxnSpLocks/>
+          </p:cNvCxnSpPr>
+          <p:nvPr/>
+        </p:nvCxnSpPr>
+        <p:spPr>
+          <a:xfrm>
+            <a:off x="1426972" y="2978556"/>
+            <a:ext cx="1597352" cy="927486"/>
+          </a:xfrm>
+          <a:prstGeom prst="straightConnector1">
+            <a:avLst/>
+          </a:prstGeom>
+          <a:ln>
+            <a:solidFill>
+              <a:schemeClr val="accent2">
+                <a:lumMod val="75000"/>
+              </a:schemeClr>
+            </a:solidFill>
+            <a:headEnd type="triangle"/>
+            <a:tailEnd type="triangle"/>
+          </a:ln>
+        </p:spPr>
+        <p:style>
+          <a:lnRef idx="1">
+            <a:schemeClr val="accent1"/>
+          </a:lnRef>
+          <a:fillRef idx="0">
+            <a:schemeClr val="accent1"/>
+          </a:fillRef>
+          <a:effectRef idx="0">
+            <a:schemeClr val="accent1"/>
+          </a:effectRef>
+          <a:fontRef idx="minor">
+            <a:schemeClr val="tx1"/>
+          </a:fontRef>
+        </p:style>
+      </p:cxnSp>
+      <p:cxnSp>
+        <p:nvCxnSpPr>
+          <p:cNvPr id="56" name="Gerade Verbindung mit Pfeil 55">
+            <a:extLst>
+              <a:ext uri="{FF2B5EF4-FFF2-40B4-BE49-F238E27FC236}">
+                <a16:creationId xmlns:a16="http://schemas.microsoft.com/office/drawing/2014/main" id="{5851C4FA-4C78-29D4-21BD-D989513144E8}"/>
+              </a:ext>
+            </a:extLst>
+          </p:cNvPr>
+          <p:cNvCxnSpPr>
+            <a:cxnSpLocks/>
+          </p:cNvCxnSpPr>
+          <p:nvPr/>
+        </p:nvCxnSpPr>
+        <p:spPr>
+          <a:xfrm>
+            <a:off x="1022811" y="1578843"/>
+            <a:ext cx="0" cy="943110"/>
+          </a:xfrm>
+          <a:prstGeom prst="straightConnector1">
+            <a:avLst/>
+          </a:prstGeom>
+          <a:ln>
+            <a:solidFill>
+              <a:schemeClr val="accent2">
+                <a:lumMod val="75000"/>
+              </a:schemeClr>
+            </a:solidFill>
+            <a:headEnd type="triangle"/>
+            <a:tailEnd type="triangle"/>
+          </a:ln>
+        </p:spPr>
+        <p:style>
+          <a:lnRef idx="1">
+            <a:schemeClr val="accent1"/>
+          </a:lnRef>
+          <a:fillRef idx="0">
+            <a:schemeClr val="accent1"/>
+          </a:fillRef>
+          <a:effectRef idx="0">
+            <a:schemeClr val="accent1"/>
+          </a:effectRef>
+          <a:fontRef idx="minor">
+            <a:schemeClr val="tx1"/>
+          </a:fontRef>
+        </p:style>
+      </p:cxnSp>
+      <p:sp>
+        <p:nvSpPr>
+          <p:cNvPr id="59" name="Textfeld 58">
+            <a:extLst>
+              <a:ext uri="{FF2B5EF4-FFF2-40B4-BE49-F238E27FC236}">
+                <a16:creationId xmlns:a16="http://schemas.microsoft.com/office/drawing/2014/main" id="{7B67CCA3-0CAC-B206-E08B-93B523517AEE}"/>
+              </a:ext>
+            </a:extLst>
+          </p:cNvPr>
+          <p:cNvSpPr txBox="1"/>
+          <p:nvPr/>
+        </p:nvSpPr>
+        <p:spPr>
+          <a:xfrm>
+            <a:off x="804170" y="1820100"/>
+            <a:ext cx="293670" cy="276999"/>
+          </a:xfrm>
+          <a:prstGeom prst="rect">
+            <a:avLst/>
+          </a:prstGeom>
+          <a:noFill/>
+        </p:spPr>
+        <p:txBody>
+          <a:bodyPr wrap="none" rtlCol="0">
+            <a:spAutoFit/>
+          </a:bodyPr>
+          <a:lstStyle/>
+          <a:p>
+            <a:r>
+              <a:rPr lang="de-DE" sz="1200" dirty="0" err="1"/>
+              <a:t>L</a:t>
+            </a:r>
+            <a:r>
+              <a:rPr lang="de-DE" sz="1200" baseline="-25000" dirty="0" err="1"/>
+              <a:t>x</a:t>
+            </a:r>
+            <a:endParaRPr lang="de-DE" sz="1200" baseline="-25000" dirty="0"/>
+          </a:p>
+        </p:txBody>
+      </p:sp>
+      <p:sp>
+        <p:nvSpPr>
+          <p:cNvPr id="60" name="Textfeld 59">
+            <a:extLst>
+              <a:ext uri="{FF2B5EF4-FFF2-40B4-BE49-F238E27FC236}">
+                <a16:creationId xmlns:a16="http://schemas.microsoft.com/office/drawing/2014/main" id="{D077F0F6-B974-8D99-8C80-5144C44C124C}"/>
+              </a:ext>
+            </a:extLst>
+          </p:cNvPr>
+          <p:cNvSpPr txBox="1"/>
+          <p:nvPr/>
+        </p:nvSpPr>
+        <p:spPr>
+          <a:xfrm>
+            <a:off x="1970896" y="3334695"/>
+            <a:ext cx="289310" cy="276999"/>
+          </a:xfrm>
+          <a:prstGeom prst="rect">
+            <a:avLst/>
+          </a:prstGeom>
+          <a:noFill/>
+        </p:spPr>
+        <p:txBody>
+          <a:bodyPr wrap="none" rtlCol="0">
+            <a:spAutoFit/>
+          </a:bodyPr>
+          <a:lstStyle/>
+          <a:p>
+            <a:r>
+              <a:rPr lang="de-DE" sz="1200" dirty="0"/>
+              <a:t>L</a:t>
+            </a:r>
+            <a:r>
+              <a:rPr lang="de-DE" sz="1200" baseline="-25000" dirty="0"/>
+              <a:t>y</a:t>
+            </a:r>
+          </a:p>
+        </p:txBody>
+      </p:sp>
+      <p:sp>
+        <p:nvSpPr>
+          <p:cNvPr id="61" name="Textfeld 60">
+            <a:extLst>
+              <a:ext uri="{FF2B5EF4-FFF2-40B4-BE49-F238E27FC236}">
+                <a16:creationId xmlns:a16="http://schemas.microsoft.com/office/drawing/2014/main" id="{FEC84790-0322-1C33-A383-61C25993A9E7}"/>
+              </a:ext>
+            </a:extLst>
+          </p:cNvPr>
+          <p:cNvSpPr txBox="1"/>
+          <p:nvPr/>
+        </p:nvSpPr>
+        <p:spPr>
+          <a:xfrm>
+            <a:off x="4256456" y="3521042"/>
+            <a:ext cx="380232" cy="276999"/>
+          </a:xfrm>
+          <a:prstGeom prst="rect">
+            <a:avLst/>
+          </a:prstGeom>
+          <a:noFill/>
+        </p:spPr>
+        <p:txBody>
+          <a:bodyPr wrap="none" rtlCol="0">
+            <a:spAutoFit/>
+          </a:bodyPr>
+          <a:lstStyle/>
+          <a:p>
+            <a:r>
+              <a:rPr lang="de-DE" sz="1200" dirty="0" err="1"/>
+              <a:t>L</a:t>
+            </a:r>
+            <a:r>
+              <a:rPr lang="de-DE" sz="1200" baseline="-25000" dirty="0" err="1"/>
+              <a:t>x</a:t>
+            </a:r>
+            <a:r>
+              <a:rPr lang="de-DE" sz="1200" baseline="-25000" dirty="0"/>
+              <a:t>/y</a:t>
+            </a:r>
+          </a:p>
+        </p:txBody>
+      </p:sp>
+      <p:sp>
+        <p:nvSpPr>
+          <p:cNvPr id="62" name="Textfeld 61">
+            <a:extLst>
+              <a:ext uri="{FF2B5EF4-FFF2-40B4-BE49-F238E27FC236}">
+                <a16:creationId xmlns:a16="http://schemas.microsoft.com/office/drawing/2014/main" id="{D70F64DE-9E44-384D-CCF0-E10354963427}"/>
+              </a:ext>
+            </a:extLst>
+          </p:cNvPr>
+          <p:cNvSpPr txBox="1"/>
+          <p:nvPr/>
+        </p:nvSpPr>
+        <p:spPr>
+          <a:xfrm>
+            <a:off x="4490758" y="3544125"/>
+            <a:ext cx="3595856" cy="253916"/>
+          </a:xfrm>
+          <a:prstGeom prst="rect">
+            <a:avLst/>
+          </a:prstGeom>
+          <a:noFill/>
+        </p:spPr>
+        <p:txBody>
+          <a:bodyPr wrap="none" rtlCol="0">
+            <a:spAutoFit/>
+          </a:bodyPr>
+          <a:lstStyle/>
+          <a:p>
+            <a:r>
+              <a:rPr lang="de-DE" sz="1050" i="1" dirty="0" err="1"/>
+              <a:t>ConnectorHousingSpecification.referenceSurfaceDimensionX</a:t>
+            </a:r>
+            <a:r>
+              <a:rPr lang="de-DE" sz="1050" i="1" dirty="0"/>
+              <a:t>/Y</a:t>
             </a:r>
           </a:p>
         </p:txBody>

</xml_diff>